<commit_message>
add hold and book operations, update Appointment profile with search parameters.  update workflow overview
</commit_message>
<xml_diff>
--- a/meeting-notes/Appointment state diagram.pptx
+++ b/meeting-notes/Appointment state diagram.pptx
@@ -238,7 +238,8 @@
           <a:p>
             <a:fld id="{D416B234-FC43-3641-B805-7771F292827F}" type="datetimeFigureOut">
               <a:rPr lang="en-US" smtClean="0"/>
-              <a:t>8/2/17</a:t>
+              <a:pPr/>
+              <a:t>8/9/2017</a:t>
             </a:fld>
             <a:endParaRPr lang="en-US"/>
           </a:p>
@@ -280,6 +281,7 @@
           <a:p>
             <a:fld id="{1C688E79-7560-8749-BC98-83A820CCD3F8}" type="slidenum">
               <a:rPr lang="en-US" smtClean="0"/>
+              <a:pPr/>
               <a:t>‹#›</a:t>
             </a:fld>
             <a:endParaRPr lang="en-US"/>
@@ -289,7 +291,7 @@
     </p:spTree>
     <p:extLst>
       <p:ext uri="{BB962C8B-B14F-4D97-AF65-F5344CB8AC3E}">
-        <p14:creationId xmlns:p14="http://schemas.microsoft.com/office/powerpoint/2010/main" val="1048557045"/>
+        <p14:creationId xmlns:p14="http://schemas.microsoft.com/office/powerpoint/2010/main" xmlns="" val="1048557045"/>
       </p:ext>
     </p:extLst>
   </p:cSld>
@@ -408,7 +410,8 @@
           <a:p>
             <a:fld id="{D416B234-FC43-3641-B805-7771F292827F}" type="datetimeFigureOut">
               <a:rPr lang="en-US" smtClean="0"/>
-              <a:t>8/2/17</a:t>
+              <a:pPr/>
+              <a:t>8/9/2017</a:t>
             </a:fld>
             <a:endParaRPr lang="en-US"/>
           </a:p>
@@ -450,6 +453,7 @@
           <a:p>
             <a:fld id="{1C688E79-7560-8749-BC98-83A820CCD3F8}" type="slidenum">
               <a:rPr lang="en-US" smtClean="0"/>
+              <a:pPr/>
               <a:t>‹#›</a:t>
             </a:fld>
             <a:endParaRPr lang="en-US"/>
@@ -459,7 +463,7 @@
     </p:spTree>
     <p:extLst>
       <p:ext uri="{BB962C8B-B14F-4D97-AF65-F5344CB8AC3E}">
-        <p14:creationId xmlns:p14="http://schemas.microsoft.com/office/powerpoint/2010/main" val="266562965"/>
+        <p14:creationId xmlns:p14="http://schemas.microsoft.com/office/powerpoint/2010/main" xmlns="" val="266562965"/>
       </p:ext>
     </p:extLst>
   </p:cSld>
@@ -588,7 +592,8 @@
           <a:p>
             <a:fld id="{D416B234-FC43-3641-B805-7771F292827F}" type="datetimeFigureOut">
               <a:rPr lang="en-US" smtClean="0"/>
-              <a:t>8/2/17</a:t>
+              <a:pPr/>
+              <a:t>8/9/2017</a:t>
             </a:fld>
             <a:endParaRPr lang="en-US"/>
           </a:p>
@@ -630,6 +635,7 @@
           <a:p>
             <a:fld id="{1C688E79-7560-8749-BC98-83A820CCD3F8}" type="slidenum">
               <a:rPr lang="en-US" smtClean="0"/>
+              <a:pPr/>
               <a:t>‹#›</a:t>
             </a:fld>
             <a:endParaRPr lang="en-US"/>
@@ -639,7 +645,7 @@
     </p:spTree>
     <p:extLst>
       <p:ext uri="{BB962C8B-B14F-4D97-AF65-F5344CB8AC3E}">
-        <p14:creationId xmlns:p14="http://schemas.microsoft.com/office/powerpoint/2010/main" val="472865113"/>
+        <p14:creationId xmlns:p14="http://schemas.microsoft.com/office/powerpoint/2010/main" xmlns="" val="472865113"/>
       </p:ext>
     </p:extLst>
   </p:cSld>
@@ -758,7 +764,8 @@
           <a:p>
             <a:fld id="{D416B234-FC43-3641-B805-7771F292827F}" type="datetimeFigureOut">
               <a:rPr lang="en-US" smtClean="0"/>
-              <a:t>8/2/17</a:t>
+              <a:pPr/>
+              <a:t>8/9/2017</a:t>
             </a:fld>
             <a:endParaRPr lang="en-US"/>
           </a:p>
@@ -800,6 +807,7 @@
           <a:p>
             <a:fld id="{1C688E79-7560-8749-BC98-83A820CCD3F8}" type="slidenum">
               <a:rPr lang="en-US" smtClean="0"/>
+              <a:pPr/>
               <a:t>‹#›</a:t>
             </a:fld>
             <a:endParaRPr lang="en-US"/>
@@ -809,7 +817,7 @@
     </p:spTree>
     <p:extLst>
       <p:ext uri="{BB962C8B-B14F-4D97-AF65-F5344CB8AC3E}">
-        <p14:creationId xmlns:p14="http://schemas.microsoft.com/office/powerpoint/2010/main" val="1776177184"/>
+        <p14:creationId xmlns:p14="http://schemas.microsoft.com/office/powerpoint/2010/main" xmlns="" val="1776177184"/>
       </p:ext>
     </p:extLst>
   </p:cSld>
@@ -1004,7 +1012,8 @@
           <a:p>
             <a:fld id="{D416B234-FC43-3641-B805-7771F292827F}" type="datetimeFigureOut">
               <a:rPr lang="en-US" smtClean="0"/>
-              <a:t>8/2/17</a:t>
+              <a:pPr/>
+              <a:t>8/9/2017</a:t>
             </a:fld>
             <a:endParaRPr lang="en-US"/>
           </a:p>
@@ -1046,6 +1055,7 @@
           <a:p>
             <a:fld id="{1C688E79-7560-8749-BC98-83A820CCD3F8}" type="slidenum">
               <a:rPr lang="en-US" smtClean="0"/>
+              <a:pPr/>
               <a:t>‹#›</a:t>
             </a:fld>
             <a:endParaRPr lang="en-US"/>
@@ -1055,7 +1065,7 @@
     </p:spTree>
     <p:extLst>
       <p:ext uri="{BB962C8B-B14F-4D97-AF65-F5344CB8AC3E}">
-        <p14:creationId xmlns:p14="http://schemas.microsoft.com/office/powerpoint/2010/main" val="39754541"/>
+        <p14:creationId xmlns:p14="http://schemas.microsoft.com/office/powerpoint/2010/main" xmlns="" val="39754541"/>
       </p:ext>
     </p:extLst>
   </p:cSld>
@@ -1236,7 +1246,8 @@
           <a:p>
             <a:fld id="{D416B234-FC43-3641-B805-7771F292827F}" type="datetimeFigureOut">
               <a:rPr lang="en-US" smtClean="0"/>
-              <a:t>8/2/17</a:t>
+              <a:pPr/>
+              <a:t>8/9/2017</a:t>
             </a:fld>
             <a:endParaRPr lang="en-US"/>
           </a:p>
@@ -1278,6 +1289,7 @@
           <a:p>
             <a:fld id="{1C688E79-7560-8749-BC98-83A820CCD3F8}" type="slidenum">
               <a:rPr lang="en-US" smtClean="0"/>
+              <a:pPr/>
               <a:t>‹#›</a:t>
             </a:fld>
             <a:endParaRPr lang="en-US"/>
@@ -1287,7 +1299,7 @@
     </p:spTree>
     <p:extLst>
       <p:ext uri="{BB962C8B-B14F-4D97-AF65-F5344CB8AC3E}">
-        <p14:creationId xmlns:p14="http://schemas.microsoft.com/office/powerpoint/2010/main" val="287156370"/>
+        <p14:creationId xmlns:p14="http://schemas.microsoft.com/office/powerpoint/2010/main" xmlns="" val="287156370"/>
       </p:ext>
     </p:extLst>
   </p:cSld>
@@ -1603,7 +1615,8 @@
           <a:p>
             <a:fld id="{D416B234-FC43-3641-B805-7771F292827F}" type="datetimeFigureOut">
               <a:rPr lang="en-US" smtClean="0"/>
-              <a:t>8/2/17</a:t>
+              <a:pPr/>
+              <a:t>8/9/2017</a:t>
             </a:fld>
             <a:endParaRPr lang="en-US"/>
           </a:p>
@@ -1645,6 +1658,7 @@
           <a:p>
             <a:fld id="{1C688E79-7560-8749-BC98-83A820CCD3F8}" type="slidenum">
               <a:rPr lang="en-US" smtClean="0"/>
+              <a:pPr/>
               <a:t>‹#›</a:t>
             </a:fld>
             <a:endParaRPr lang="en-US"/>
@@ -1654,7 +1668,7 @@
     </p:spTree>
     <p:extLst>
       <p:ext uri="{BB962C8B-B14F-4D97-AF65-F5344CB8AC3E}">
-        <p14:creationId xmlns:p14="http://schemas.microsoft.com/office/powerpoint/2010/main" val="841355781"/>
+        <p14:creationId xmlns:p14="http://schemas.microsoft.com/office/powerpoint/2010/main" xmlns="" val="841355781"/>
       </p:ext>
     </p:extLst>
   </p:cSld>
@@ -1721,7 +1735,8 @@
           <a:p>
             <a:fld id="{D416B234-FC43-3641-B805-7771F292827F}" type="datetimeFigureOut">
               <a:rPr lang="en-US" smtClean="0"/>
-              <a:t>8/2/17</a:t>
+              <a:pPr/>
+              <a:t>8/9/2017</a:t>
             </a:fld>
             <a:endParaRPr lang="en-US"/>
           </a:p>
@@ -1763,6 +1778,7 @@
           <a:p>
             <a:fld id="{1C688E79-7560-8749-BC98-83A820CCD3F8}" type="slidenum">
               <a:rPr lang="en-US" smtClean="0"/>
+              <a:pPr/>
               <a:t>‹#›</a:t>
             </a:fld>
             <a:endParaRPr lang="en-US"/>
@@ -1772,7 +1788,7 @@
     </p:spTree>
     <p:extLst>
       <p:ext uri="{BB962C8B-B14F-4D97-AF65-F5344CB8AC3E}">
-        <p14:creationId xmlns:p14="http://schemas.microsoft.com/office/powerpoint/2010/main" val="1634279419"/>
+        <p14:creationId xmlns:p14="http://schemas.microsoft.com/office/powerpoint/2010/main" xmlns="" val="1634279419"/>
       </p:ext>
     </p:extLst>
   </p:cSld>
@@ -1816,7 +1832,8 @@
           <a:p>
             <a:fld id="{D416B234-FC43-3641-B805-7771F292827F}" type="datetimeFigureOut">
               <a:rPr lang="en-US" smtClean="0"/>
-              <a:t>8/2/17</a:t>
+              <a:pPr/>
+              <a:t>8/9/2017</a:t>
             </a:fld>
             <a:endParaRPr lang="en-US"/>
           </a:p>
@@ -1858,6 +1875,7 @@
           <a:p>
             <a:fld id="{1C688E79-7560-8749-BC98-83A820CCD3F8}" type="slidenum">
               <a:rPr lang="en-US" smtClean="0"/>
+              <a:pPr/>
               <a:t>‹#›</a:t>
             </a:fld>
             <a:endParaRPr lang="en-US"/>
@@ -1867,7 +1885,7 @@
     </p:spTree>
     <p:extLst>
       <p:ext uri="{BB962C8B-B14F-4D97-AF65-F5344CB8AC3E}">
-        <p14:creationId xmlns:p14="http://schemas.microsoft.com/office/powerpoint/2010/main" val="1018350003"/>
+        <p14:creationId xmlns:p14="http://schemas.microsoft.com/office/powerpoint/2010/main" xmlns="" val="1018350003"/>
       </p:ext>
     </p:extLst>
   </p:cSld>
@@ -2093,7 +2111,8 @@
           <a:p>
             <a:fld id="{D416B234-FC43-3641-B805-7771F292827F}" type="datetimeFigureOut">
               <a:rPr lang="en-US" smtClean="0"/>
-              <a:t>8/2/17</a:t>
+              <a:pPr/>
+              <a:t>8/9/2017</a:t>
             </a:fld>
             <a:endParaRPr lang="en-US"/>
           </a:p>
@@ -2135,6 +2154,7 @@
           <a:p>
             <a:fld id="{1C688E79-7560-8749-BC98-83A820CCD3F8}" type="slidenum">
               <a:rPr lang="en-US" smtClean="0"/>
+              <a:pPr/>
               <a:t>‹#›</a:t>
             </a:fld>
             <a:endParaRPr lang="en-US"/>
@@ -2144,7 +2164,7 @@
     </p:spTree>
     <p:extLst>
       <p:ext uri="{BB962C8B-B14F-4D97-AF65-F5344CB8AC3E}">
-        <p14:creationId xmlns:p14="http://schemas.microsoft.com/office/powerpoint/2010/main" val="2111317478"/>
+        <p14:creationId xmlns:p14="http://schemas.microsoft.com/office/powerpoint/2010/main" xmlns="" val="2111317478"/>
       </p:ext>
     </p:extLst>
   </p:cSld>
@@ -2346,7 +2366,8 @@
           <a:p>
             <a:fld id="{D416B234-FC43-3641-B805-7771F292827F}" type="datetimeFigureOut">
               <a:rPr lang="en-US" smtClean="0"/>
-              <a:t>8/2/17</a:t>
+              <a:pPr/>
+              <a:t>8/9/2017</a:t>
             </a:fld>
             <a:endParaRPr lang="en-US"/>
           </a:p>
@@ -2388,6 +2409,7 @@
           <a:p>
             <a:fld id="{1C688E79-7560-8749-BC98-83A820CCD3F8}" type="slidenum">
               <a:rPr lang="en-US" smtClean="0"/>
+              <a:pPr/>
               <a:t>‹#›</a:t>
             </a:fld>
             <a:endParaRPr lang="en-US"/>
@@ -2397,7 +2419,7 @@
     </p:spTree>
     <p:extLst>
       <p:ext uri="{BB962C8B-B14F-4D97-AF65-F5344CB8AC3E}">
-        <p14:creationId xmlns:p14="http://schemas.microsoft.com/office/powerpoint/2010/main" val="2040553365"/>
+        <p14:creationId xmlns:p14="http://schemas.microsoft.com/office/powerpoint/2010/main" xmlns="" val="2040553365"/>
       </p:ext>
     </p:extLst>
   </p:cSld>
@@ -2559,7 +2581,8 @@
           <a:p>
             <a:fld id="{D416B234-FC43-3641-B805-7771F292827F}" type="datetimeFigureOut">
               <a:rPr lang="en-US" smtClean="0"/>
-              <a:t>8/2/17</a:t>
+              <a:pPr/>
+              <a:t>8/9/2017</a:t>
             </a:fld>
             <a:endParaRPr lang="en-US"/>
           </a:p>
@@ -2637,6 +2660,7 @@
           <a:p>
             <a:fld id="{1C688E79-7560-8749-BC98-83A820CCD3F8}" type="slidenum">
               <a:rPr lang="en-US" smtClean="0"/>
+              <a:pPr/>
               <a:t>‹#›</a:t>
             </a:fld>
             <a:endParaRPr lang="en-US"/>
@@ -2646,7 +2670,7 @@
     </p:spTree>
     <p:extLst>
       <p:ext uri="{BB962C8B-B14F-4D97-AF65-F5344CB8AC3E}">
-        <p14:creationId xmlns:p14="http://schemas.microsoft.com/office/powerpoint/2010/main" val="989665580"/>
+        <p14:creationId xmlns:p14="http://schemas.microsoft.com/office/powerpoint/2010/main" xmlns="" val="989665580"/>
       </p:ext>
     </p:extLst>
   </p:cSld>
@@ -4016,10 +4040,49 @@
           </a:p>
         </p:txBody>
       </p:sp>
+      <p:cxnSp>
+        <p:nvCxnSpPr>
+          <p:cNvPr id="29" name="Shape 28"/>
+          <p:cNvCxnSpPr>
+            <a:stCxn id="14" idx="3"/>
+            <a:endCxn id="23" idx="0"/>
+          </p:cNvCxnSpPr>
+          <p:nvPr/>
+        </p:nvCxnSpPr>
+        <p:spPr>
+          <a:xfrm>
+            <a:off x="3614297" y="1646749"/>
+            <a:ext cx="2741821" cy="2526112"/>
+          </a:xfrm>
+          <a:prstGeom prst="bentConnector2">
+            <a:avLst/>
+          </a:prstGeom>
+          <a:ln w="31750">
+            <a:solidFill>
+              <a:schemeClr val="tx1"/>
+            </a:solidFill>
+            <a:tailEnd type="arrow"/>
+          </a:ln>
+        </p:spPr>
+        <p:style>
+          <a:lnRef idx="1">
+            <a:schemeClr val="accent1"/>
+          </a:lnRef>
+          <a:fillRef idx="0">
+            <a:schemeClr val="accent1"/>
+          </a:fillRef>
+          <a:effectRef idx="0">
+            <a:schemeClr val="accent1"/>
+          </a:effectRef>
+          <a:fontRef idx="minor">
+            <a:schemeClr val="tx1"/>
+          </a:fontRef>
+        </p:style>
+      </p:cxnSp>
     </p:spTree>
     <p:extLst>
       <p:ext uri="{BB962C8B-B14F-4D97-AF65-F5344CB8AC3E}">
-        <p14:creationId xmlns:p14="http://schemas.microsoft.com/office/powerpoint/2010/main" val="847448033"/>
+        <p14:creationId xmlns:p14="http://schemas.microsoft.com/office/powerpoint/2010/main" xmlns="" val="847448033"/>
       </p:ext>
     </p:extLst>
   </p:cSld>
@@ -4072,7 +4135,7 @@
     </a:clrScheme>
     <a:fontScheme name="Office">
       <a:majorFont>
-        <a:latin typeface="Calibri Light" panose="020F0302020204030204"/>
+        <a:latin typeface="Calibri Light"/>
         <a:ea typeface=""/>
         <a:cs typeface=""/>
         <a:font script="Jpan" typeface="Yu Gothic Light"/>
@@ -4107,7 +4170,7 @@
         <a:font script="Geor" typeface="Sylfaen"/>
       </a:majorFont>
       <a:minorFont>
-        <a:latin typeface="Calibri" panose="020F0502020204030204"/>
+        <a:latin typeface="Calibri"/>
         <a:ea typeface=""/>
         <a:cs typeface=""/>
         <a:font script="Jpan" typeface="Yu Gothic"/>
@@ -4284,7 +4347,7 @@
   <a:extraClrSchemeLst/>
   <a:extLst>
     <a:ext uri="{05A4C25C-085E-4340-85A3-A5531E510DB2}">
-      <thm15:themeFamily xmlns:thm15="http://schemas.microsoft.com/office/thememl/2012/main" name="Office Theme" id="{62F939B6-93AF-4DB8-9C6B-D6C7DFDC589F}" vid="{4A3C46E8-61CC-4603-A589-7422A47A8E4A}"/>
+      <thm15:themeFamily xmlns:thm15="http://schemas.microsoft.com/office/thememl/2012/main" xmlns="" name="Office Theme" id="{62F939B6-93AF-4DB8-9C6B-D6C7DFDC589F}" vid="{4A3C46E8-61CC-4603-A589-7422A47A8E4A}"/>
     </a:ext>
   </a:extLst>
 </a:theme>

</xml_diff>

<commit_message>
fix operations and examples
</commit_message>
<xml_diff>
--- a/meeting-notes/Appointment state diagram.pptx
+++ b/meeting-notes/Appointment state diagram.pptx
@@ -255,7 +255,7 @@
             <a:fld id="{D416B234-FC43-3641-B805-7771F292827F}" type="datetimeFigureOut">
               <a:rPr lang="en-US" smtClean="0"/>
               <a:pPr/>
-              <a:t>8/12/17</a:t>
+              <a:t>3/19/18</a:t>
             </a:fld>
             <a:endParaRPr lang="en-US"/>
           </a:p>
@@ -427,7 +427,7 @@
             <a:fld id="{D416B234-FC43-3641-B805-7771F292827F}" type="datetimeFigureOut">
               <a:rPr lang="en-US" smtClean="0"/>
               <a:pPr/>
-              <a:t>8/12/17</a:t>
+              <a:t>3/19/18</a:t>
             </a:fld>
             <a:endParaRPr lang="en-US"/>
           </a:p>
@@ -609,7 +609,7 @@
             <a:fld id="{D416B234-FC43-3641-B805-7771F292827F}" type="datetimeFigureOut">
               <a:rPr lang="en-US" smtClean="0"/>
               <a:pPr/>
-              <a:t>8/12/17</a:t>
+              <a:t>3/19/18</a:t>
             </a:fld>
             <a:endParaRPr lang="en-US"/>
           </a:p>
@@ -781,7 +781,7 @@
             <a:fld id="{D416B234-FC43-3641-B805-7771F292827F}" type="datetimeFigureOut">
               <a:rPr lang="en-US" smtClean="0"/>
               <a:pPr/>
-              <a:t>8/12/17</a:t>
+              <a:t>3/19/18</a:t>
             </a:fld>
             <a:endParaRPr lang="en-US"/>
           </a:p>
@@ -1029,7 +1029,7 @@
             <a:fld id="{D416B234-FC43-3641-B805-7771F292827F}" type="datetimeFigureOut">
               <a:rPr lang="en-US" smtClean="0"/>
               <a:pPr/>
-              <a:t>8/12/17</a:t>
+              <a:t>3/19/18</a:t>
             </a:fld>
             <a:endParaRPr lang="en-US"/>
           </a:p>
@@ -1263,7 +1263,7 @@
             <a:fld id="{D416B234-FC43-3641-B805-7771F292827F}" type="datetimeFigureOut">
               <a:rPr lang="en-US" smtClean="0"/>
               <a:pPr/>
-              <a:t>8/12/17</a:t>
+              <a:t>3/19/18</a:t>
             </a:fld>
             <a:endParaRPr lang="en-US"/>
           </a:p>
@@ -1632,7 +1632,7 @@
             <a:fld id="{D416B234-FC43-3641-B805-7771F292827F}" type="datetimeFigureOut">
               <a:rPr lang="en-US" smtClean="0"/>
               <a:pPr/>
-              <a:t>8/12/17</a:t>
+              <a:t>3/19/18</a:t>
             </a:fld>
             <a:endParaRPr lang="en-US"/>
           </a:p>
@@ -1752,7 +1752,7 @@
             <a:fld id="{D416B234-FC43-3641-B805-7771F292827F}" type="datetimeFigureOut">
               <a:rPr lang="en-US" smtClean="0"/>
               <a:pPr/>
-              <a:t>8/12/17</a:t>
+              <a:t>3/19/18</a:t>
             </a:fld>
             <a:endParaRPr lang="en-US"/>
           </a:p>
@@ -1849,7 +1849,7 @@
             <a:fld id="{D416B234-FC43-3641-B805-7771F292827F}" type="datetimeFigureOut">
               <a:rPr lang="en-US" smtClean="0"/>
               <a:pPr/>
-              <a:t>8/12/17</a:t>
+              <a:t>3/19/18</a:t>
             </a:fld>
             <a:endParaRPr lang="en-US"/>
           </a:p>
@@ -2128,7 +2128,7 @@
             <a:fld id="{D416B234-FC43-3641-B805-7771F292827F}" type="datetimeFigureOut">
               <a:rPr lang="en-US" smtClean="0"/>
               <a:pPr/>
-              <a:t>8/12/17</a:t>
+              <a:t>3/19/18</a:t>
             </a:fld>
             <a:endParaRPr lang="en-US"/>
           </a:p>
@@ -2383,7 +2383,7 @@
             <a:fld id="{D416B234-FC43-3641-B805-7771F292827F}" type="datetimeFigureOut">
               <a:rPr lang="en-US" smtClean="0"/>
               <a:pPr/>
-              <a:t>8/12/17</a:t>
+              <a:t>3/19/18</a:t>
             </a:fld>
             <a:endParaRPr lang="en-US"/>
           </a:p>
@@ -2598,7 +2598,7 @@
             <a:fld id="{D416B234-FC43-3641-B805-7771F292827F}" type="datetimeFigureOut">
               <a:rPr lang="en-US" smtClean="0"/>
               <a:pPr/>
-              <a:t>8/12/17</a:t>
+              <a:t>3/19/18</a:t>
             </a:fld>
             <a:endParaRPr lang="en-US"/>
           </a:p>
@@ -4196,7 +4196,7 @@
         <p:spPr>
           <a:xfrm>
             <a:off x="5474732" y="1912558"/>
-            <a:ext cx="441037" cy="369332"/>
+            <a:ext cx="774993" cy="369332"/>
           </a:xfrm>
           <a:prstGeom prst="rect">
             <a:avLst/>
@@ -4210,8 +4210,8 @@
           <a:lstStyle/>
           <a:p>
             <a:r>
-              <a:rPr lang="en-US" dirty="0" smtClean="0"/>
-              <a:t>6r</a:t>
+              <a:rPr lang="en-US" smtClean="0"/>
+              <a:t>6r, 6c</a:t>
             </a:r>
             <a:endParaRPr lang="en-US" dirty="0"/>
           </a:p>
@@ -4225,8 +4225,8 @@
         </p:nvSpPr>
         <p:spPr>
           <a:xfrm>
-            <a:off x="5473034" y="2907735"/>
-            <a:ext cx="442735" cy="369332"/>
+            <a:off x="6356117" y="4641210"/>
+            <a:ext cx="756196" cy="646331"/>
           </a:xfrm>
           <a:prstGeom prst="rect">
             <a:avLst/>
@@ -4241,7 +4241,11 @@
           <a:p>
             <a:r>
               <a:rPr lang="en-US" dirty="0" smtClean="0"/>
-              <a:t>9c</a:t>
+              <a:t>10</a:t>
+            </a:r>
+            <a:r>
+              <a:rPr lang="en-US" dirty="0" smtClean="0"/>
+              <a:t>c, 11c</a:t>
             </a:r>
             <a:endParaRPr lang="en-US" dirty="0"/>
           </a:p>
@@ -4276,6 +4280,36 @@
             <a:r>
               <a:rPr lang="en-US" smtClean="0"/>
               <a:t>r or 6r </a:t>
+            </a:r>
+            <a:endParaRPr lang="en-US" dirty="0"/>
+          </a:p>
+        </p:txBody>
+      </p:sp>
+      <p:sp>
+        <p:nvSpPr>
+          <p:cNvPr id="36" name="TextBox 35"/>
+          <p:cNvSpPr txBox="1"/>
+          <p:nvPr/>
+        </p:nvSpPr>
+        <p:spPr>
+          <a:xfrm>
+            <a:off x="5515937" y="2957103"/>
+            <a:ext cx="442735" cy="369332"/>
+          </a:xfrm>
+          <a:prstGeom prst="rect">
+            <a:avLst/>
+          </a:prstGeom>
+          <a:noFill/>
+        </p:spPr>
+        <p:txBody>
+          <a:bodyPr wrap="square" rtlCol="0">
+            <a:spAutoFit/>
+          </a:bodyPr>
+          <a:lstStyle/>
+          <a:p>
+            <a:r>
+              <a:rPr lang="en-US" dirty="0" smtClean="0"/>
+              <a:t>9c</a:t>
             </a:r>
             <a:endParaRPr lang="en-US" dirty="0"/>
           </a:p>

</xml_diff>